<commit_message>
Added slide on future plans
</commit_message>
<xml_diff>
--- a/Final Docs/Haptic Feedback with nitinol Final.pptx
+++ b/Final Docs/Haptic Feedback with nitinol Final.pptx
@@ -14,6 +14,7 @@
     <p:sldId id="262" r:id="rId8"/>
     <p:sldId id="264" r:id="rId9"/>
     <p:sldId id="265" r:id="rId10"/>
+    <p:sldId id="266" r:id="rId11"/>
   </p:sldIdLst>
   <p:sldSz cx="12192000" cy="6858000"/>
   <p:notesSz cx="6858000" cy="9144000"/>
@@ -5395,6 +5396,153 @@
 </p:sld>
 </file>
 
+<file path=ppt/slides/slide10.xml><?xml version="1.0" encoding="utf-8"?>
+<p:sld xmlns:a="http://schemas.openxmlformats.org/drawingml/2006/main" xmlns:r="http://schemas.openxmlformats.org/officeDocument/2006/relationships" xmlns:p="http://schemas.openxmlformats.org/presentationml/2006/main">
+  <p:cSld>
+    <p:spTree>
+      <p:nvGrpSpPr>
+        <p:cNvPr id="1" name=""/>
+        <p:cNvGrpSpPr/>
+        <p:nvPr/>
+      </p:nvGrpSpPr>
+      <p:grpSpPr>
+        <a:xfrm>
+          <a:off x="0" y="0"/>
+          <a:ext cx="0" cy="0"/>
+          <a:chOff x="0" y="0"/>
+          <a:chExt cx="0" cy="0"/>
+        </a:xfrm>
+      </p:grpSpPr>
+      <p:sp>
+        <p:nvSpPr>
+          <p:cNvPr id="4" name="Title 3">
+            <a:extLst>
+              <a:ext uri="{FF2B5EF4-FFF2-40B4-BE49-F238E27FC236}">
+                <a16:creationId xmlns:a16="http://schemas.microsoft.com/office/drawing/2014/main" id="{6B104243-EE7B-4B9A-BD8A-FC64A26B3A77}"/>
+              </a:ext>
+            </a:extLst>
+          </p:cNvPr>
+          <p:cNvSpPr>
+            <a:spLocks noGrp="1"/>
+          </p:cNvSpPr>
+          <p:nvPr>
+            <p:ph type="title"/>
+          </p:nvPr>
+        </p:nvSpPr>
+        <p:spPr>
+          <a:xfrm>
+            <a:off x="684212" y="321732"/>
+            <a:ext cx="8534400" cy="1507067"/>
+          </a:xfrm>
+        </p:spPr>
+        <p:txBody>
+          <a:bodyPr/>
+          <a:lstStyle/>
+          <a:p>
+            <a:r>
+              <a:rPr lang="en-GB" dirty="0"/>
+              <a:t>Going Forwards </a:t>
+            </a:r>
+          </a:p>
+        </p:txBody>
+      </p:sp>
+      <p:sp>
+        <p:nvSpPr>
+          <p:cNvPr id="5" name="Content Placeholder 4">
+            <a:extLst>
+              <a:ext uri="{FF2B5EF4-FFF2-40B4-BE49-F238E27FC236}">
+                <a16:creationId xmlns:a16="http://schemas.microsoft.com/office/drawing/2014/main" id="{E88E31B0-0AD5-4B3E-B0ED-E658BB2C3447}"/>
+              </a:ext>
+            </a:extLst>
+          </p:cNvPr>
+          <p:cNvSpPr>
+            <a:spLocks noGrp="1"/>
+          </p:cNvSpPr>
+          <p:nvPr>
+            <p:ph idx="1"/>
+          </p:nvPr>
+        </p:nvSpPr>
+        <p:spPr>
+          <a:xfrm>
+            <a:off x="684212" y="2374900"/>
+            <a:ext cx="6961188" cy="3615267"/>
+          </a:xfrm>
+        </p:spPr>
+        <p:txBody>
+          <a:bodyPr/>
+          <a:lstStyle/>
+          <a:p>
+            <a:r>
+              <a:rPr lang="en-GB" dirty="0">
+                <a:solidFill>
+                  <a:schemeClr val="tx1"/>
+                </a:solidFill>
+              </a:rPr>
+              <a:t>The Glove has a reasonable amount of potential. There are several application that it could be used for in the future: </a:t>
+            </a:r>
+          </a:p>
+          <a:p>
+            <a:r>
+              <a:rPr lang="en-GB" dirty="0">
+                <a:solidFill>
+                  <a:schemeClr val="tx1"/>
+                </a:solidFill>
+              </a:rPr>
+              <a:t>Haptic Gaming glove </a:t>
+            </a:r>
+          </a:p>
+          <a:p>
+            <a:r>
+              <a:rPr lang="en-GB" dirty="0">
+                <a:solidFill>
+                  <a:schemeClr val="tx1"/>
+                </a:solidFill>
+              </a:rPr>
+              <a:t>Physiotherapy </a:t>
+            </a:r>
+          </a:p>
+          <a:p>
+            <a:r>
+              <a:rPr lang="en-GB" dirty="0">
+                <a:solidFill>
+                  <a:schemeClr val="tx1"/>
+                </a:solidFill>
+              </a:rPr>
+              <a:t>Prosthetic hand</a:t>
+            </a:r>
+          </a:p>
+          <a:p>
+            <a:r>
+              <a:rPr lang="en-GB" dirty="0">
+                <a:solidFill>
+                  <a:schemeClr val="tx1"/>
+                </a:solidFill>
+              </a:rPr>
+              <a:t>Training </a:t>
+            </a:r>
+          </a:p>
+          <a:p>
+            <a:endParaRPr lang="en-GB" dirty="0">
+              <a:solidFill>
+                <a:schemeClr val="tx1"/>
+              </a:solidFill>
+            </a:endParaRPr>
+          </a:p>
+        </p:txBody>
+      </p:sp>
+    </p:spTree>
+    <p:extLst>
+      <p:ext uri="{BB962C8B-B14F-4D97-AF65-F5344CB8AC3E}">
+        <p14:creationId xmlns:p14="http://schemas.microsoft.com/office/powerpoint/2010/main" val="822731379"/>
+      </p:ext>
+    </p:extLst>
+  </p:cSld>
+  <p:clrMapOvr>
+    <a:masterClrMapping/>
+  </p:clrMapOvr>
+</p:sld>
+</file>
+
 <file path=ppt/slides/slide2.xml><?xml version="1.0" encoding="utf-8"?>
 <p:sld xmlns:a="http://schemas.openxmlformats.org/drawingml/2006/main" xmlns:r="http://schemas.openxmlformats.org/officeDocument/2006/relationships" xmlns:p="http://schemas.openxmlformats.org/presentationml/2006/main">
   <p:cSld>
@@ -6450,7 +6598,7 @@
                   <a:schemeClr val="tx1"/>
                 </a:solidFill>
               </a:rPr>
-              <a:t>Gantt Chart: Forecast work </a:t>
+              <a:t>Gantt Chart: Forecast work (Updated twice)</a:t>
             </a:r>
           </a:p>
           <a:p>
@@ -6700,6 +6848,37 @@
             </a:r>
           </a:p>
           <a:p>
+            <a:r>
+              <a:rPr lang="en-GB" dirty="0">
+                <a:solidFill>
+                  <a:schemeClr val="tx1"/>
+                </a:solidFill>
+              </a:rPr>
+              <a:t>Use Thicker Nitinol wire : </a:t>
+            </a:r>
+            <a:r>
+              <a:rPr lang="en-GB" dirty="0">
+                <a:hlinkClick r:id="rId2"/>
+              </a:rPr>
+              <a:t>https://www.robotshop.com/media/files/PDF/flexinol-technical-data.pdf</a:t>
+            </a:r>
+            <a:endParaRPr lang="en-GB" dirty="0">
+              <a:solidFill>
+                <a:schemeClr val="tx1"/>
+              </a:solidFill>
+            </a:endParaRPr>
+          </a:p>
+          <a:p>
+            <a:pPr marL="0" indent="0">
+              <a:buNone/>
+            </a:pPr>
+            <a:endParaRPr lang="en-GB" dirty="0">
+              <a:solidFill>
+                <a:schemeClr val="tx1"/>
+              </a:solidFill>
+            </a:endParaRPr>
+          </a:p>
+          <a:p>
             <a:endParaRPr lang="en-GB" dirty="0">
               <a:solidFill>
                 <a:schemeClr val="tx1"/>
@@ -6850,16 +7029,6 @@
                 </a:solidFill>
               </a:rPr>
               <a:t>Create Nitinol Springs</a:t>
-            </a:r>
-          </a:p>
-          <a:p>
-            <a:r>
-              <a:rPr lang="en-GB" dirty="0">
-                <a:solidFill>
-                  <a:schemeClr val="tx1"/>
-                </a:solidFill>
-              </a:rPr>
-              <a:t>Use Thicker Nitinol wire </a:t>
             </a:r>
           </a:p>
           <a:p>

</xml_diff>